<commit_message>
Fixed Registration and user input validations
</commit_message>
<xml_diff>
--- a/Ivanna_Mahabir_Code/Project_0/Project 0 – Mock Bank.pptx
+++ b/Ivanna_Mahabir_Code/Project_0/Project 0 – Mock Bank.pptx
@@ -6,10 +6,12 @@
   </p:sldMasterIdLst>
   <p:sldIdLst>
     <p:sldId id="256" r:id="rId2"/>
-    <p:sldId id="257" r:id="rId3"/>
-    <p:sldId id="258" r:id="rId4"/>
-    <p:sldId id="259" r:id="rId5"/>
-    <p:sldId id="260" r:id="rId6"/>
+    <p:sldId id="258" r:id="rId3"/>
+    <p:sldId id="257" r:id="rId4"/>
+    <p:sldId id="264" r:id="rId5"/>
+    <p:sldId id="259" r:id="rId6"/>
+    <p:sldId id="260" r:id="rId7"/>
+    <p:sldId id="263" r:id="rId8"/>
   </p:sldIdLst>
   <p:sldSz cx="12192000" cy="6858000"/>
   <p:notesSz cx="6858000" cy="9144000"/>
@@ -108,6 +110,11 @@
       </a:defRPr>
     </a:lvl9pPr>
   </p:defaultTextStyle>
+  <p:extLst>
+    <p:ext uri="{EFAFB233-063F-42B5-8137-9DF3F51BA10A}">
+      <p15:sldGuideLst xmlns:p15="http://schemas.microsoft.com/office/powerpoint/2012/main"/>
+    </p:ext>
+  </p:extLst>
 </p:presentation>
 </file>
 
@@ -324,7 +331,7 @@
           <a:p>
             <a:fld id="{5E97D523-4504-4629-9F52-9CE679843B40}" type="datetimeFigureOut">
               <a:rPr lang="en-US" smtClean="0"/>
-              <a:t>1/15/2020</a:t>
+              <a:t>1/16/2020</a:t>
             </a:fld>
             <a:endParaRPr lang="en-US"/>
           </a:p>
@@ -615,7 +622,7 @@
           <a:p>
             <a:fld id="{5E97D523-4504-4629-9F52-9CE679843B40}" type="datetimeFigureOut">
               <a:rPr lang="en-US" smtClean="0"/>
-              <a:t>1/15/2020</a:t>
+              <a:t>1/16/2020</a:t>
             </a:fld>
             <a:endParaRPr lang="en-US"/>
           </a:p>
@@ -874,7 +881,7 @@
           <a:p>
             <a:fld id="{5E97D523-4504-4629-9F52-9CE679843B40}" type="datetimeFigureOut">
               <a:rPr lang="en-US" smtClean="0"/>
-              <a:t>1/15/2020</a:t>
+              <a:t>1/16/2020</a:t>
             </a:fld>
             <a:endParaRPr lang="en-US"/>
           </a:p>
@@ -1343,7 +1350,7 @@
           <a:p>
             <a:fld id="{5E97D523-4504-4629-9F52-9CE679843B40}" type="datetimeFigureOut">
               <a:rPr lang="en-US" smtClean="0"/>
-              <a:t>1/15/2020</a:t>
+              <a:t>1/16/2020</a:t>
             </a:fld>
             <a:endParaRPr lang="en-US"/>
           </a:p>
@@ -1523,7 +1530,7 @@
           <a:p>
             <a:fld id="{5E97D523-4504-4629-9F52-9CE679843B40}" type="datetimeFigureOut">
               <a:rPr lang="en-US" smtClean="0"/>
-              <a:t>1/15/2020</a:t>
+              <a:t>1/16/2020</a:t>
             </a:fld>
             <a:endParaRPr lang="en-US"/>
           </a:p>
@@ -2099,7 +2106,7 @@
           <a:p>
             <a:fld id="{5E97D523-4504-4629-9F52-9CE679843B40}" type="datetimeFigureOut">
               <a:rPr lang="en-US" smtClean="0"/>
-              <a:t>1/15/2020</a:t>
+              <a:t>1/16/2020</a:t>
             </a:fld>
             <a:endParaRPr lang="en-US"/>
           </a:p>
@@ -2431,7 +2438,7 @@
           <a:p>
             <a:fld id="{5E97D523-4504-4629-9F52-9CE679843B40}" type="datetimeFigureOut">
               <a:rPr lang="en-US" smtClean="0"/>
-              <a:t>1/15/2020</a:t>
+              <a:t>1/16/2020</a:t>
             </a:fld>
             <a:endParaRPr lang="en-US"/>
           </a:p>
@@ -2606,7 +2613,7 @@
           <a:p>
             <a:fld id="{5E97D523-4504-4629-9F52-9CE679843B40}" type="datetimeFigureOut">
               <a:rPr lang="en-US" smtClean="0"/>
-              <a:t>1/15/2020</a:t>
+              <a:t>1/16/2020</a:t>
             </a:fld>
             <a:endParaRPr lang="en-US"/>
           </a:p>
@@ -2786,7 +2793,7 @@
           <a:p>
             <a:fld id="{5E97D523-4504-4629-9F52-9CE679843B40}" type="datetimeFigureOut">
               <a:rPr lang="en-US" smtClean="0"/>
-              <a:t>1/15/2020</a:t>
+              <a:t>1/16/2020</a:t>
             </a:fld>
             <a:endParaRPr lang="en-US"/>
           </a:p>
@@ -2956,7 +2963,7 @@
           <a:p>
             <a:fld id="{5E97D523-4504-4629-9F52-9CE679843B40}" type="datetimeFigureOut">
               <a:rPr lang="en-US" smtClean="0"/>
-              <a:t>1/15/2020</a:t>
+              <a:t>1/16/2020</a:t>
             </a:fld>
             <a:endParaRPr lang="en-US"/>
           </a:p>
@@ -3213,7 +3220,7 @@
           <a:p>
             <a:fld id="{5E97D523-4504-4629-9F52-9CE679843B40}" type="datetimeFigureOut">
               <a:rPr lang="en-US" smtClean="0"/>
-              <a:t>1/15/2020</a:t>
+              <a:t>1/16/2020</a:t>
             </a:fld>
             <a:endParaRPr lang="en-US"/>
           </a:p>
@@ -3505,7 +3512,7 @@
           <a:p>
             <a:fld id="{5E97D523-4504-4629-9F52-9CE679843B40}" type="datetimeFigureOut">
               <a:rPr lang="en-US" smtClean="0"/>
-              <a:t>1/15/2020</a:t>
+              <a:t>1/16/2020</a:t>
             </a:fld>
             <a:endParaRPr lang="en-US"/>
           </a:p>
@@ -3935,7 +3942,7 @@
           <a:p>
             <a:fld id="{5E97D523-4504-4629-9F52-9CE679843B40}" type="datetimeFigureOut">
               <a:rPr lang="en-US" smtClean="0"/>
-              <a:t>1/15/2020</a:t>
+              <a:t>1/16/2020</a:t>
             </a:fld>
             <a:endParaRPr lang="en-US"/>
           </a:p>
@@ -4053,7 +4060,7 @@
           <a:p>
             <a:fld id="{5E97D523-4504-4629-9F52-9CE679843B40}" type="datetimeFigureOut">
               <a:rPr lang="en-US" smtClean="0"/>
-              <a:t>1/15/2020</a:t>
+              <a:t>1/16/2020</a:t>
             </a:fld>
             <a:endParaRPr lang="en-US"/>
           </a:p>
@@ -4148,7 +4155,7 @@
           <a:p>
             <a:fld id="{5E97D523-4504-4629-9F52-9CE679843B40}" type="datetimeFigureOut">
               <a:rPr lang="en-US" smtClean="0"/>
-              <a:t>1/15/2020</a:t>
+              <a:t>1/16/2020</a:t>
             </a:fld>
             <a:endParaRPr lang="en-US"/>
           </a:p>
@@ -4431,7 +4438,7 @@
           <a:p>
             <a:fld id="{5E97D523-4504-4629-9F52-9CE679843B40}" type="datetimeFigureOut">
               <a:rPr lang="en-US" smtClean="0"/>
-              <a:t>1/15/2020</a:t>
+              <a:t>1/16/2020</a:t>
             </a:fld>
             <a:endParaRPr lang="en-US"/>
           </a:p>
@@ -4722,7 +4729,7 @@
           <a:p>
             <a:fld id="{5E97D523-4504-4629-9F52-9CE679843B40}" type="datetimeFigureOut">
               <a:rPr lang="en-US" smtClean="0"/>
-              <a:t>1/15/2020</a:t>
+              <a:t>1/16/2020</a:t>
             </a:fld>
             <a:endParaRPr lang="en-US"/>
           </a:p>
@@ -4953,7 +4960,7 @@
           <a:p>
             <a:fld id="{5E97D523-4504-4629-9F52-9CE679843B40}" type="datetimeFigureOut">
               <a:rPr lang="en-US" smtClean="0"/>
-              <a:t>1/15/2020</a:t>
+              <a:t>1/16/2020</a:t>
             </a:fld>
             <a:endParaRPr lang="en-US"/>
           </a:p>
@@ -5744,10 +5751,9 @@
           <a:lstStyle/>
           <a:p>
             <a:r>
-              <a:rPr lang="en-US"/>
-              <a:t>Project 0 – Mock Bank</a:t>
-            </a:r>
-            <a:endParaRPr lang="en-US" dirty="0"/>
+              <a:rPr lang="en-US" dirty="0"/>
+              <a:t>Project 0 – c Bank</a:t>
+            </a:r>
           </a:p>
         </p:txBody>
       </p:sp>
@@ -5773,10 +5779,9 @@
           <a:lstStyle/>
           <a:p>
             <a:r>
-              <a:rPr lang="en-US"/>
-              <a:t>Presented by: Ivanna Mahabir</a:t>
-            </a:r>
-            <a:endParaRPr lang="en-US" dirty="0"/>
+              <a:rPr lang="en-US" dirty="0"/>
+              <a:t>Presented by: Ivanna S. Mahabir</a:t>
+            </a:r>
           </a:p>
         </p:txBody>
       </p:sp>
@@ -5794,70 +5799,6 @@
 </file>
 
 <file path=ppt/slides/slide2.xml><?xml version="1.0" encoding="utf-8"?>
-<p:sld xmlns:a="http://schemas.openxmlformats.org/drawingml/2006/main" xmlns:r="http://schemas.openxmlformats.org/officeDocument/2006/relationships" xmlns:p="http://schemas.openxmlformats.org/presentationml/2006/main">
-  <p:cSld>
-    <p:spTree>
-      <p:nvGrpSpPr>
-        <p:cNvPr id="1" name=""/>
-        <p:cNvGrpSpPr/>
-        <p:nvPr/>
-      </p:nvGrpSpPr>
-      <p:grpSpPr>
-        <a:xfrm>
-          <a:off x="0" y="0"/>
-          <a:ext cx="0" cy="0"/>
-          <a:chOff x="0" y="0"/>
-          <a:chExt cx="0" cy="0"/>
-        </a:xfrm>
-      </p:grpSpPr>
-      <p:pic>
-        <p:nvPicPr>
-          <p:cNvPr id="5" name="Content Placeholder 4" descr="A screenshot of a cell phone&#10;&#10;Description automatically generated">
-            <a:extLst>
-              <a:ext uri="{FF2B5EF4-FFF2-40B4-BE49-F238E27FC236}">
-                <a16:creationId xmlns:a16="http://schemas.microsoft.com/office/drawing/2014/main" id="{2579E4F1-0373-4690-97DA-E003AAF62422}"/>
-              </a:ext>
-            </a:extLst>
-          </p:cNvPr>
-          <p:cNvPicPr>
-            <a:picLocks noGrp="1" noChangeAspect="1"/>
-          </p:cNvPicPr>
-          <p:nvPr>
-            <p:ph idx="1"/>
-          </p:nvPr>
-        </p:nvPicPr>
-        <p:blipFill rotWithShape="1">
-          <a:blip r:embed="rId2">
-            <a:extLst>
-              <a:ext uri="{28A0092B-C50C-407E-A947-70E740481C1C}">
-                <a14:useLocalDpi xmlns:a14="http://schemas.microsoft.com/office/drawing/2010/main" val="0"/>
-              </a:ext>
-            </a:extLst>
-          </a:blip>
-          <a:srcRect l="3818" t="4050" r="3702" b="5481"/>
-          <a:stretch/>
-        </p:blipFill>
-        <p:spPr>
-          <a:xfrm>
-            <a:off x="2008095" y="85164"/>
-            <a:ext cx="8846983" cy="6687671"/>
-          </a:xfrm>
-        </p:spPr>
-      </p:pic>
-    </p:spTree>
-    <p:extLst>
-      <p:ext uri="{BB962C8B-B14F-4D97-AF65-F5344CB8AC3E}">
-        <p14:creationId xmlns:p14="http://schemas.microsoft.com/office/powerpoint/2010/main" val="1246164589"/>
-      </p:ext>
-    </p:extLst>
-  </p:cSld>
-  <p:clrMapOvr>
-    <a:masterClrMapping/>
-  </p:clrMapOvr>
-</p:sld>
-</file>
-
-<file path=ppt/slides/slide3.xml><?xml version="1.0" encoding="utf-8"?>
 <p:sld xmlns:a="http://schemas.openxmlformats.org/drawingml/2006/main" xmlns:r="http://schemas.openxmlformats.org/officeDocument/2006/relationships" xmlns:p="http://schemas.openxmlformats.org/presentationml/2006/main">
   <p:cSld>
     <p:spTree>
@@ -5947,7 +5888,154 @@
 </p:sld>
 </file>
 
+<file path=ppt/slides/slide3.xml><?xml version="1.0" encoding="utf-8"?>
+<p:sld xmlns:a="http://schemas.openxmlformats.org/drawingml/2006/main" xmlns:r="http://schemas.openxmlformats.org/officeDocument/2006/relationships" xmlns:p="http://schemas.openxmlformats.org/presentationml/2006/main">
+  <p:cSld>
+    <p:spTree>
+      <p:nvGrpSpPr>
+        <p:cNvPr id="1" name=""/>
+        <p:cNvGrpSpPr/>
+        <p:nvPr/>
+      </p:nvGrpSpPr>
+      <p:grpSpPr>
+        <a:xfrm>
+          <a:off x="0" y="0"/>
+          <a:ext cx="0" cy="0"/>
+          <a:chOff x="0" y="0"/>
+          <a:chExt cx="0" cy="0"/>
+        </a:xfrm>
+      </p:grpSpPr>
+      <p:pic>
+        <p:nvPicPr>
+          <p:cNvPr id="5" name="Content Placeholder 4" descr="A screenshot of a cell phone&#10;&#10;Description automatically generated">
+            <a:extLst>
+              <a:ext uri="{FF2B5EF4-FFF2-40B4-BE49-F238E27FC236}">
+                <a16:creationId xmlns:a16="http://schemas.microsoft.com/office/drawing/2014/main" id="{2579E4F1-0373-4690-97DA-E003AAF62422}"/>
+              </a:ext>
+            </a:extLst>
+          </p:cNvPr>
+          <p:cNvPicPr>
+            <a:picLocks noGrp="1" noChangeAspect="1"/>
+          </p:cNvPicPr>
+          <p:nvPr>
+            <p:ph idx="1"/>
+          </p:nvPr>
+        </p:nvPicPr>
+        <p:blipFill rotWithShape="1">
+          <a:blip r:embed="rId2">
+            <a:extLst>
+              <a:ext uri="{28A0092B-C50C-407E-A947-70E740481C1C}">
+                <a14:useLocalDpi xmlns:a14="http://schemas.microsoft.com/office/drawing/2010/main" val="0"/>
+              </a:ext>
+            </a:extLst>
+          </a:blip>
+          <a:srcRect l="3818" t="10926" r="3702" b="5481"/>
+          <a:stretch/>
+        </p:blipFill>
+        <p:spPr>
+          <a:xfrm>
+            <a:off x="1423408" y="92318"/>
+            <a:ext cx="9545614" cy="6667327"/>
+          </a:xfrm>
+        </p:spPr>
+      </p:pic>
+    </p:spTree>
+    <p:extLst>
+      <p:ext uri="{BB962C8B-B14F-4D97-AF65-F5344CB8AC3E}">
+        <p14:creationId xmlns:p14="http://schemas.microsoft.com/office/powerpoint/2010/main" val="1246164589"/>
+      </p:ext>
+    </p:extLst>
+  </p:cSld>
+  <p:clrMapOvr>
+    <a:masterClrMapping/>
+  </p:clrMapOvr>
+</p:sld>
+</file>
+
 <file path=ppt/slides/slide4.xml><?xml version="1.0" encoding="utf-8"?>
+<p:sld xmlns:a="http://schemas.openxmlformats.org/drawingml/2006/main" xmlns:r="http://schemas.openxmlformats.org/officeDocument/2006/relationships" xmlns:p="http://schemas.openxmlformats.org/presentationml/2006/main">
+  <p:cSld>
+    <p:spTree>
+      <p:nvGrpSpPr>
+        <p:cNvPr id="1" name=""/>
+        <p:cNvGrpSpPr/>
+        <p:nvPr/>
+      </p:nvGrpSpPr>
+      <p:grpSpPr>
+        <a:xfrm>
+          <a:off x="0" y="0"/>
+          <a:ext cx="0" cy="0"/>
+          <a:chOff x="0" y="0"/>
+          <a:chExt cx="0" cy="0"/>
+        </a:xfrm>
+      </p:grpSpPr>
+      <p:sp>
+        <p:nvSpPr>
+          <p:cNvPr id="2" name="Title 1">
+            <a:extLst>
+              <a:ext uri="{FF2B5EF4-FFF2-40B4-BE49-F238E27FC236}">
+                <a16:creationId xmlns:a16="http://schemas.microsoft.com/office/drawing/2014/main" id="{532D7796-E458-4EE8-A883-B6C8D1088064}"/>
+              </a:ext>
+            </a:extLst>
+          </p:cNvPr>
+          <p:cNvSpPr>
+            <a:spLocks noGrp="1"/>
+          </p:cNvSpPr>
+          <p:nvPr>
+            <p:ph type="ctrTitle"/>
+          </p:nvPr>
+        </p:nvSpPr>
+        <p:spPr/>
+        <p:txBody>
+          <a:bodyPr/>
+          <a:lstStyle/>
+          <a:p>
+            <a:r>
+              <a:rPr lang="en-US" dirty="0"/>
+              <a:t>Demo</a:t>
+            </a:r>
+          </a:p>
+        </p:txBody>
+      </p:sp>
+      <p:sp>
+        <p:nvSpPr>
+          <p:cNvPr id="5" name="Subtitle 4">
+            <a:extLst>
+              <a:ext uri="{FF2B5EF4-FFF2-40B4-BE49-F238E27FC236}">
+                <a16:creationId xmlns:a16="http://schemas.microsoft.com/office/drawing/2014/main" id="{F6F8A9B4-7E58-4CAC-AFD5-2A8CD47CA439}"/>
+              </a:ext>
+            </a:extLst>
+          </p:cNvPr>
+          <p:cNvSpPr>
+            <a:spLocks noGrp="1"/>
+          </p:cNvSpPr>
+          <p:nvPr>
+            <p:ph type="subTitle" idx="1"/>
+          </p:nvPr>
+        </p:nvSpPr>
+        <p:spPr/>
+        <p:txBody>
+          <a:bodyPr/>
+          <a:lstStyle/>
+          <a:p>
+            <a:endParaRPr lang="en-US"/>
+          </a:p>
+        </p:txBody>
+      </p:sp>
+    </p:spTree>
+    <p:extLst>
+      <p:ext uri="{BB962C8B-B14F-4D97-AF65-F5344CB8AC3E}">
+        <p14:creationId xmlns:p14="http://schemas.microsoft.com/office/powerpoint/2010/main" val="3302638324"/>
+      </p:ext>
+    </p:extLst>
+  </p:cSld>
+  <p:clrMapOvr>
+    <a:masterClrMapping/>
+  </p:clrMapOvr>
+</p:sld>
+</file>
+
+<file path=ppt/slides/slide5.xml><?xml version="1.0" encoding="utf-8"?>
 <p:sld xmlns:a="http://schemas.openxmlformats.org/drawingml/2006/main" xmlns:r="http://schemas.openxmlformats.org/officeDocument/2006/relationships" xmlns:p="http://schemas.openxmlformats.org/presentationml/2006/main">
   <p:cSld>
     <p:spTree>
@@ -6075,7 +6163,7 @@
 </p:sld>
 </file>
 
-<file path=ppt/slides/slide5.xml><?xml version="1.0" encoding="utf-8"?>
+<file path=ppt/slides/slide6.xml><?xml version="1.0" encoding="utf-8"?>
 <p:sld xmlns:a="http://schemas.openxmlformats.org/drawingml/2006/main" xmlns:r="http://schemas.openxmlformats.org/officeDocument/2006/relationships" xmlns:p="http://schemas.openxmlformats.org/presentationml/2006/main">
   <p:cSld>
     <p:spTree>
@@ -6265,6 +6353,89 @@
     <p:extLst>
       <p:ext uri="{BB962C8B-B14F-4D97-AF65-F5344CB8AC3E}">
         <p14:creationId xmlns:p14="http://schemas.microsoft.com/office/powerpoint/2010/main" val="1346715579"/>
+      </p:ext>
+    </p:extLst>
+  </p:cSld>
+  <p:clrMapOvr>
+    <a:masterClrMapping/>
+  </p:clrMapOvr>
+</p:sld>
+</file>
+
+<file path=ppt/slides/slide7.xml><?xml version="1.0" encoding="utf-8"?>
+<p:sld xmlns:a="http://schemas.openxmlformats.org/drawingml/2006/main" xmlns:r="http://schemas.openxmlformats.org/officeDocument/2006/relationships" xmlns:p="http://schemas.openxmlformats.org/presentationml/2006/main">
+  <p:cSld>
+    <p:spTree>
+      <p:nvGrpSpPr>
+        <p:cNvPr id="1" name=""/>
+        <p:cNvGrpSpPr/>
+        <p:nvPr/>
+      </p:nvGrpSpPr>
+      <p:grpSpPr>
+        <a:xfrm>
+          <a:off x="0" y="0"/>
+          <a:ext cx="0" cy="0"/>
+          <a:chOff x="0" y="0"/>
+          <a:chExt cx="0" cy="0"/>
+        </a:xfrm>
+      </p:grpSpPr>
+      <p:sp>
+        <p:nvSpPr>
+          <p:cNvPr id="2" name="Title 1">
+            <a:extLst>
+              <a:ext uri="{FF2B5EF4-FFF2-40B4-BE49-F238E27FC236}">
+                <a16:creationId xmlns:a16="http://schemas.microsoft.com/office/drawing/2014/main" id="{532D7796-E458-4EE8-A883-B6C8D1088064}"/>
+              </a:ext>
+            </a:extLst>
+          </p:cNvPr>
+          <p:cNvSpPr>
+            <a:spLocks noGrp="1"/>
+          </p:cNvSpPr>
+          <p:nvPr>
+            <p:ph type="ctrTitle"/>
+          </p:nvPr>
+        </p:nvSpPr>
+        <p:spPr/>
+        <p:txBody>
+          <a:bodyPr/>
+          <a:lstStyle/>
+          <a:p>
+            <a:r>
+              <a:rPr lang="en-US" dirty="0"/>
+              <a:t>Thank you</a:t>
+            </a:r>
+          </a:p>
+        </p:txBody>
+      </p:sp>
+      <p:sp>
+        <p:nvSpPr>
+          <p:cNvPr id="5" name="Subtitle 4">
+            <a:extLst>
+              <a:ext uri="{FF2B5EF4-FFF2-40B4-BE49-F238E27FC236}">
+                <a16:creationId xmlns:a16="http://schemas.microsoft.com/office/drawing/2014/main" id="{F6F8A9B4-7E58-4CAC-AFD5-2A8CD47CA439}"/>
+              </a:ext>
+            </a:extLst>
+          </p:cNvPr>
+          <p:cNvSpPr>
+            <a:spLocks noGrp="1"/>
+          </p:cNvSpPr>
+          <p:nvPr>
+            <p:ph type="subTitle" idx="1"/>
+          </p:nvPr>
+        </p:nvSpPr>
+        <p:spPr/>
+        <p:txBody>
+          <a:bodyPr/>
+          <a:lstStyle/>
+          <a:p>
+            <a:endParaRPr lang="en-US"/>
+          </a:p>
+        </p:txBody>
+      </p:sp>
+    </p:spTree>
+    <p:extLst>
+      <p:ext uri="{BB962C8B-B14F-4D97-AF65-F5344CB8AC3E}">
+        <p14:creationId xmlns:p14="http://schemas.microsoft.com/office/powerpoint/2010/main" val="1318497593"/>
       </p:ext>
     </p:extLst>
   </p:cSld>

</xml_diff>